<commit_message>
Added @ssaqld twitter to 1st PPT Template slide
</commit_message>
<xml_diff>
--- a/SSAQLD_welcome_slides/SSAQLD_Welcome_Template.pptx
+++ b/SSAQLD_welcome_slides/SSAQLD_Welcome_Template.pptx
@@ -108,6 +108,22 @@
       </a:defRPr>
     </a:lvl9pPr>
   </p:defaultTextStyle>
+  <p:extLst>
+    <p:ext uri="{EFAFB233-063F-42B5-8137-9DF3F51BA10A}">
+      <p15:sldGuideLst xmlns:p15="http://schemas.microsoft.com/office/powerpoint/2012/main">
+        <p15:guide id="1" orient="horz" pos="2160">
+          <p15:clr>
+            <a:srgbClr val="A4A3A4"/>
+          </p15:clr>
+        </p15:guide>
+        <p15:guide id="2" pos="2880">
+          <p15:clr>
+            <a:srgbClr val="A4A3A4"/>
+          </p15:clr>
+        </p15:guide>
+      </p15:sldGuideLst>
+    </p:ext>
+  </p:extLst>
 </p:presentation>
 </file>
 
@@ -242,7 +258,7 @@
           <a:p>
             <a:fld id="{70C230C8-7C34-45E0-BCC4-6A2899FA43FD}" type="datetimeFigureOut">
               <a:rPr lang="en-AU" smtClean="0"/>
-              <a:t>4/09/19</a:t>
+              <a:t>6/9/19</a:t>
             </a:fld>
             <a:endParaRPr lang="en-AU"/>
           </a:p>
@@ -412,7 +428,7 @@
           <a:p>
             <a:fld id="{70C230C8-7C34-45E0-BCC4-6A2899FA43FD}" type="datetimeFigureOut">
               <a:rPr lang="en-AU" smtClean="0"/>
-              <a:t>4/09/19</a:t>
+              <a:t>6/9/19</a:t>
             </a:fld>
             <a:endParaRPr lang="en-AU"/>
           </a:p>
@@ -592,7 +608,7 @@
           <a:p>
             <a:fld id="{70C230C8-7C34-45E0-BCC4-6A2899FA43FD}" type="datetimeFigureOut">
               <a:rPr lang="en-AU" smtClean="0"/>
-              <a:t>4/09/19</a:t>
+              <a:t>6/9/19</a:t>
             </a:fld>
             <a:endParaRPr lang="en-AU"/>
           </a:p>
@@ -762,7 +778,7 @@
           <a:p>
             <a:fld id="{70C230C8-7C34-45E0-BCC4-6A2899FA43FD}" type="datetimeFigureOut">
               <a:rPr lang="en-AU" smtClean="0"/>
-              <a:t>4/09/19</a:t>
+              <a:t>6/9/19</a:t>
             </a:fld>
             <a:endParaRPr lang="en-AU"/>
           </a:p>
@@ -1006,7 +1022,7 @@
           <a:p>
             <a:fld id="{70C230C8-7C34-45E0-BCC4-6A2899FA43FD}" type="datetimeFigureOut">
               <a:rPr lang="en-AU" smtClean="0"/>
-              <a:t>4/09/19</a:t>
+              <a:t>6/9/19</a:t>
             </a:fld>
             <a:endParaRPr lang="en-AU"/>
           </a:p>
@@ -1238,7 +1254,7 @@
           <a:p>
             <a:fld id="{70C230C8-7C34-45E0-BCC4-6A2899FA43FD}" type="datetimeFigureOut">
               <a:rPr lang="en-AU" smtClean="0"/>
-              <a:t>4/09/19</a:t>
+              <a:t>6/9/19</a:t>
             </a:fld>
             <a:endParaRPr lang="en-AU"/>
           </a:p>
@@ -1605,7 +1621,7 @@
           <a:p>
             <a:fld id="{70C230C8-7C34-45E0-BCC4-6A2899FA43FD}" type="datetimeFigureOut">
               <a:rPr lang="en-AU" smtClean="0"/>
-              <a:t>4/09/19</a:t>
+              <a:t>6/9/19</a:t>
             </a:fld>
             <a:endParaRPr lang="en-AU"/>
           </a:p>
@@ -1723,7 +1739,7 @@
           <a:p>
             <a:fld id="{70C230C8-7C34-45E0-BCC4-6A2899FA43FD}" type="datetimeFigureOut">
               <a:rPr lang="en-AU" smtClean="0"/>
-              <a:t>4/09/19</a:t>
+              <a:t>6/9/19</a:t>
             </a:fld>
             <a:endParaRPr lang="en-AU"/>
           </a:p>
@@ -1818,7 +1834,7 @@
           <a:p>
             <a:fld id="{70C230C8-7C34-45E0-BCC4-6A2899FA43FD}" type="datetimeFigureOut">
               <a:rPr lang="en-AU" smtClean="0"/>
-              <a:t>4/09/19</a:t>
+              <a:t>6/9/19</a:t>
             </a:fld>
             <a:endParaRPr lang="en-AU"/>
           </a:p>
@@ -2095,7 +2111,7 @@
           <a:p>
             <a:fld id="{70C230C8-7C34-45E0-BCC4-6A2899FA43FD}" type="datetimeFigureOut">
               <a:rPr lang="en-AU" smtClean="0"/>
-              <a:t>4/09/19</a:t>
+              <a:t>6/9/19</a:t>
             </a:fld>
             <a:endParaRPr lang="en-AU"/>
           </a:p>
@@ -2352,7 +2368,7 @@
           <a:p>
             <a:fld id="{70C230C8-7C34-45E0-BCC4-6A2899FA43FD}" type="datetimeFigureOut">
               <a:rPr lang="en-AU" smtClean="0"/>
-              <a:t>4/09/19</a:t>
+              <a:t>6/9/19</a:t>
             </a:fld>
             <a:endParaRPr lang="en-AU"/>
           </a:p>
@@ -2565,7 +2581,7 @@
           <a:p>
             <a:fld id="{70C230C8-7C34-45E0-BCC4-6A2899FA43FD}" type="datetimeFigureOut">
               <a:rPr lang="en-AU" smtClean="0"/>
-              <a:t>4/09/19</a:t>
+              <a:t>6/9/19</a:t>
             </a:fld>
             <a:endParaRPr lang="en-AU"/>
           </a:p>
@@ -2975,7 +2991,7 @@
           <p:cNvPr id="2" name="Title 1">
             <a:extLst>
               <a:ext uri="{FF2B5EF4-FFF2-40B4-BE49-F238E27FC236}">
-                <a16:creationId xmlns="" xmlns:a16="http://schemas.microsoft.com/office/drawing/2014/main" id="{C732F1CB-04DF-43E9-8CEA-31F277342823}"/>
+                <a16:creationId xmlns:a16="http://schemas.microsoft.com/office/drawing/2014/main" id="{C732F1CB-04DF-43E9-8CEA-31F277342823}"/>
               </a:ext>
             </a:extLst>
           </p:cNvPr>
@@ -3003,21 +3019,7 @@
                 <a:latin typeface="News Gothic MT"/>
                 <a:cs typeface="News Gothic MT"/>
               </a:rPr>
-              <a:t>SSA QLD </a:t>
-            </a:r>
-            <a:r>
-              <a:rPr lang="en-AU" sz="4400" b="1" dirty="0" smtClean="0">
-                <a:latin typeface="News Gothic MT"/>
-                <a:cs typeface="News Gothic MT"/>
-              </a:rPr>
-              <a:t>Sept 2019</a:t>
-            </a:r>
-            <a:r>
-              <a:rPr lang="en-AU" sz="4400" dirty="0">
-                <a:latin typeface="News Gothic MT"/>
-                <a:cs typeface="News Gothic MT"/>
-              </a:rPr>
-              <a:t/>
+              <a:t>SSA QLD Sept 2019</a:t>
             </a:r>
             <a:br>
               <a:rPr lang="en-AU" sz="4400" dirty="0">
@@ -3043,7 +3045,7 @@
           <p:cNvPr id="4" name="Picture 3">
             <a:extLst>
               <a:ext uri="{FF2B5EF4-FFF2-40B4-BE49-F238E27FC236}">
-                <a16:creationId xmlns="" xmlns:a16="http://schemas.microsoft.com/office/drawing/2014/main" id="{4B6822B6-E3A9-401C-905B-164B1BD70C4B}"/>
+                <a16:creationId xmlns:a16="http://schemas.microsoft.com/office/drawing/2014/main" id="{4B6822B6-E3A9-401C-905B-164B1BD70C4B}"/>
               </a:ext>
             </a:extLst>
           </p:cNvPr>
@@ -3139,7 +3141,7 @@
           <a:lstStyle/>
           <a:p>
             <a:r>
-              <a:rPr lang="en-US" sz="3200" b="1" dirty="0" smtClean="0">
+              <a:rPr lang="en-US" sz="3200" b="1" dirty="0">
                 <a:solidFill>
                   <a:schemeClr val="accent1">
                     <a:lumMod val="50000"/>
@@ -3150,15 +3152,6 @@
               </a:rPr>
               <a:t>Follow us on:</a:t>
             </a:r>
-            <a:endParaRPr lang="en-US" sz="3200" b="1" dirty="0">
-              <a:solidFill>
-                <a:schemeClr val="accent1">
-                  <a:lumMod val="50000"/>
-                </a:schemeClr>
-              </a:solidFill>
-              <a:latin typeface="Candara"/>
-              <a:cs typeface="Candara"/>
-            </a:endParaRPr>
           </a:p>
         </p:txBody>
       </p:sp>
@@ -3194,7 +3187,7 @@
         </p:nvSpPr>
         <p:spPr>
           <a:xfrm>
-            <a:off x="2164862" y="5076093"/>
+            <a:off x="2052128" y="5076093"/>
             <a:ext cx="2876061" cy="523220"/>
           </a:xfrm>
           <a:prstGeom prst="rect">
@@ -3209,7 +3202,7 @@
           <a:lstStyle/>
           <a:p>
             <a:r>
-              <a:rPr lang="en-US" sz="2800" b="1" dirty="0" smtClean="0">
+              <a:rPr lang="en-US" sz="2800" b="1" dirty="0">
                 <a:solidFill>
                   <a:schemeClr val="accent1">
                     <a:lumMod val="50000"/>
@@ -3221,7 +3214,138 @@
               <a:t>@</a:t>
             </a:r>
             <a:r>
-              <a:rPr lang="en-US" sz="2800" b="1" dirty="0" err="1" smtClean="0">
+              <a:rPr lang="en-US" sz="2800" b="1" dirty="0" err="1">
+                <a:solidFill>
+                  <a:schemeClr val="accent1">
+                    <a:lumMod val="50000"/>
+                  </a:schemeClr>
+                </a:solidFill>
+                <a:latin typeface="Candara"/>
+                <a:cs typeface="Candara"/>
+              </a:rPr>
+              <a:t>ssaqld</a:t>
+            </a:r>
+            <a:endParaRPr lang="en-US" sz="2800" b="1" dirty="0">
+              <a:solidFill>
+                <a:schemeClr val="accent1">
+                  <a:lumMod val="50000"/>
+                </a:schemeClr>
+              </a:solidFill>
+              <a:latin typeface="Candara"/>
+              <a:cs typeface="Candara"/>
+            </a:endParaRPr>
+          </a:p>
+        </p:txBody>
+      </p:sp>
+      <p:sp>
+        <p:nvSpPr>
+          <p:cNvPr id="10" name="TextBox 9"/>
+          <p:cNvSpPr txBox="1"/>
+          <p:nvPr/>
+        </p:nvSpPr>
+        <p:spPr>
+          <a:xfrm>
+            <a:off x="2124256" y="5873263"/>
+            <a:ext cx="2876061" cy="523220"/>
+          </a:xfrm>
+          <a:prstGeom prst="rect">
+            <a:avLst/>
+          </a:prstGeom>
+          <a:noFill/>
+        </p:spPr>
+        <p:txBody>
+          <a:bodyPr wrap="square" rtlCol="0">
+            <a:spAutoFit/>
+          </a:bodyPr>
+          <a:lstStyle/>
+          <a:p>
+            <a:r>
+              <a:rPr lang="en-US" sz="2800" b="1" dirty="0">
+                <a:solidFill>
+                  <a:schemeClr val="accent1">
+                    <a:lumMod val="50000"/>
+                  </a:schemeClr>
+                </a:solidFill>
+                <a:latin typeface="Candara"/>
+                <a:cs typeface="Candara"/>
+              </a:rPr>
+              <a:t>@SSAQLD</a:t>
+            </a:r>
+          </a:p>
+        </p:txBody>
+      </p:sp>
+      <p:pic>
+        <p:nvPicPr>
+          <p:cNvPr id="11" name="Picture 10">
+            <a:extLst>
+              <a:ext uri="{FF2B5EF4-FFF2-40B4-BE49-F238E27FC236}">
+                <a16:creationId xmlns:a16="http://schemas.microsoft.com/office/drawing/2014/main" id="{48DC9DDA-0E9C-1449-94EE-4795E3683C00}"/>
+              </a:ext>
+            </a:extLst>
+          </p:cNvPr>
+          <p:cNvPicPr>
+            <a:picLocks noChangeAspect="1"/>
+          </p:cNvPicPr>
+          <p:nvPr/>
+        </p:nvPicPr>
+        <p:blipFill>
+          <a:blip r:embed="rId4"/>
+          <a:stretch>
+            <a:fillRect/>
+          </a:stretch>
+        </p:blipFill>
+        <p:spPr>
+          <a:xfrm>
+            <a:off x="5282355" y="5001846"/>
+            <a:ext cx="767887" cy="683845"/>
+          </a:xfrm>
+          <a:prstGeom prst="rect">
+            <a:avLst/>
+          </a:prstGeom>
+        </p:spPr>
+      </p:pic>
+      <p:sp>
+        <p:nvSpPr>
+          <p:cNvPr id="12" name="TextBox 11">
+            <a:extLst>
+              <a:ext uri="{FF2B5EF4-FFF2-40B4-BE49-F238E27FC236}">
+                <a16:creationId xmlns:a16="http://schemas.microsoft.com/office/drawing/2014/main" id="{18051C96-C5D9-B14A-BC4D-D01AF7A4AEE2}"/>
+              </a:ext>
+            </a:extLst>
+          </p:cNvPr>
+          <p:cNvSpPr txBox="1"/>
+          <p:nvPr/>
+        </p:nvSpPr>
+        <p:spPr>
+          <a:xfrm>
+            <a:off x="6267939" y="5076093"/>
+            <a:ext cx="2876061" cy="523220"/>
+          </a:xfrm>
+          <a:prstGeom prst="rect">
+            <a:avLst/>
+          </a:prstGeom>
+          <a:noFill/>
+        </p:spPr>
+        <p:txBody>
+          <a:bodyPr wrap="square" rtlCol="0">
+            <a:spAutoFit/>
+          </a:bodyPr>
+          <a:lstStyle/>
+          <a:p>
+            <a:r>
+              <a:rPr lang="en-US" sz="2800" b="1" dirty="0">
+                <a:solidFill>
+                  <a:schemeClr val="accent1">
+                    <a:lumMod val="50000"/>
+                  </a:schemeClr>
+                </a:solidFill>
+                <a:latin typeface="Candara"/>
+                <a:cs typeface="Candara"/>
+              </a:rPr>
+              <a:t>@</a:t>
+            </a:r>
+            <a:r>
+              <a:rPr lang="en-US" sz="2800" b="1" dirty="0" err="1">
                 <a:solidFill>
                   <a:schemeClr val="accent1">
                     <a:lumMod val="50000"/>
@@ -3231,52 +3355,6 @@
                 <a:cs typeface="Candara"/>
               </a:rPr>
               <a:t>StatSocAus</a:t>
-            </a:r>
-            <a:endParaRPr lang="en-US" sz="2800" b="1" dirty="0">
-              <a:solidFill>
-                <a:schemeClr val="accent1">
-                  <a:lumMod val="50000"/>
-                </a:schemeClr>
-              </a:solidFill>
-              <a:latin typeface="Candara"/>
-              <a:cs typeface="Candara"/>
-            </a:endParaRPr>
-          </a:p>
-        </p:txBody>
-      </p:sp>
-      <p:sp>
-        <p:nvSpPr>
-          <p:cNvPr id="10" name="TextBox 9"/>
-          <p:cNvSpPr txBox="1"/>
-          <p:nvPr/>
-        </p:nvSpPr>
-        <p:spPr>
-          <a:xfrm>
-            <a:off x="2262042" y="5873263"/>
-            <a:ext cx="2876061" cy="523220"/>
-          </a:xfrm>
-          <a:prstGeom prst="rect">
-            <a:avLst/>
-          </a:prstGeom>
-          <a:noFill/>
-        </p:spPr>
-        <p:txBody>
-          <a:bodyPr wrap="square" rtlCol="0">
-            <a:spAutoFit/>
-          </a:bodyPr>
-          <a:lstStyle/>
-          <a:p>
-            <a:r>
-              <a:rPr lang="en-US" sz="2800" b="1" dirty="0" smtClean="0">
-                <a:solidFill>
-                  <a:schemeClr val="accent1">
-                    <a:lumMod val="50000"/>
-                  </a:schemeClr>
-                </a:solidFill>
-                <a:latin typeface="Candara"/>
-                <a:cs typeface="Candara"/>
-              </a:rPr>
-              <a:t>@SSAQLD</a:t>
             </a:r>
             <a:endParaRPr lang="en-US" sz="2800" b="1" dirty="0">
               <a:solidFill>
@@ -3380,8 +3458,20 @@
                 <a:tableStyleId>{2D5ABB26-0587-4C30-8999-92F81FD0307C}</a:tableStyleId>
               </a:tblPr>
               <a:tblGrid>
-                <a:gridCol w="3512811"/>
-                <a:gridCol w="4373889"/>
+                <a:gridCol w="3512811">
+                  <a:extLst>
+                    <a:ext uri="{9D8B030D-6E8A-4147-A177-3AD203B41FA5}">
+                      <a16:colId xmlns:a16="http://schemas.microsoft.com/office/drawing/2014/main" val="20000"/>
+                    </a:ext>
+                  </a:extLst>
+                </a:gridCol>
+                <a:gridCol w="4373889">
+                  <a:extLst>
+                    <a:ext uri="{9D8B030D-6E8A-4147-A177-3AD203B41FA5}">
+                      <a16:colId xmlns:a16="http://schemas.microsoft.com/office/drawing/2014/main" val="20001"/>
+                    </a:ext>
+                  </a:extLst>
+                </a:gridCol>
               </a:tblGrid>
               <a:tr h="370840">
                 <a:tc>
@@ -3390,21 +3480,21 @@
                     <a:lstStyle/>
                     <a:p>
                       <a:r>
-                        <a:rPr lang="en-AU" sz="1800" dirty="0" smtClean="0">
+                        <a:rPr lang="en-AU" sz="1800" dirty="0">
                           <a:latin typeface="Arial"/>
                           <a:cs typeface="Arial"/>
                         </a:rPr>
                         <a:t>Miranda </a:t>
                       </a:r>
                       <a:r>
-                        <a:rPr lang="en-AU" sz="1800" dirty="0" err="1" smtClean="0">
+                        <a:rPr lang="en-AU" sz="1800" dirty="0" err="1">
                           <a:latin typeface="Arial"/>
                           <a:cs typeface="Arial"/>
                         </a:rPr>
                         <a:t>Mortlock</a:t>
                       </a:r>
                       <a:r>
-                        <a:rPr lang="en-AU" sz="1800" dirty="0" smtClean="0">
+                        <a:rPr lang="en-AU" sz="1800" dirty="0">
                           <a:latin typeface="Arial"/>
                           <a:cs typeface="Arial"/>
                         </a:rPr>
@@ -3475,7 +3565,7 @@
                         <a:defRPr/>
                       </a:pPr>
                       <a:r>
-                        <a:rPr lang="en-AU" sz="1800" dirty="0" smtClean="0">
+                        <a:rPr lang="en-AU" sz="1800" dirty="0">
                           <a:solidFill>
                             <a:srgbClr val="FF0000"/>
                           </a:solidFill>
@@ -3525,6 +3615,11 @@
                     </a:lnB>
                   </a:tcPr>
                 </a:tc>
+                <a:extLst>
+                  <a:ext uri="{0D108BD9-81ED-4DB2-BD59-A6C34878D82A}">
+                    <a16:rowId xmlns:a16="http://schemas.microsoft.com/office/drawing/2014/main" val="10000"/>
+                  </a:ext>
+                </a:extLst>
               </a:tr>
               <a:tr h="370840">
                 <a:tc>
@@ -3533,7 +3628,7 @@
                     <a:lstStyle/>
                     <a:p>
                       <a:r>
-                        <a:rPr lang="en-AU" sz="1800" dirty="0" smtClean="0">
+                        <a:rPr lang="en-AU" sz="1800" dirty="0">
                           <a:latin typeface="Arial"/>
                           <a:cs typeface="Arial"/>
                         </a:rPr>
@@ -3587,7 +3682,7 @@
                     <a:lstStyle/>
                     <a:p>
                       <a:r>
-                        <a:rPr lang="en-AU" sz="1800" dirty="0" smtClean="0">
+                        <a:rPr lang="en-AU" sz="1800" dirty="0">
                           <a:solidFill>
                             <a:srgbClr val="FF0000"/>
                           </a:solidFill>
@@ -3638,6 +3733,11 @@
                     </a:lnB>
                   </a:tcPr>
                 </a:tc>
+                <a:extLst>
+                  <a:ext uri="{0D108BD9-81ED-4DB2-BD59-A6C34878D82A}">
+                    <a16:rowId xmlns:a16="http://schemas.microsoft.com/office/drawing/2014/main" val="10001"/>
+                  </a:ext>
+                </a:extLst>
               </a:tr>
               <a:tr h="370840">
                 <a:tc>
@@ -3646,28 +3746,28 @@
                     <a:lstStyle/>
                     <a:p>
                       <a:r>
-                        <a:rPr lang="en-AU" sz="1800" dirty="0" err="1" smtClean="0">
+                        <a:rPr lang="en-AU" sz="1800" dirty="0" err="1">
                           <a:latin typeface="Arial"/>
                           <a:cs typeface="Arial"/>
                         </a:rPr>
                         <a:t>Dimitrios</a:t>
                       </a:r>
                       <a:r>
-                        <a:rPr lang="en-AU" sz="1800" dirty="0" smtClean="0">
+                        <a:rPr lang="en-AU" sz="1800" dirty="0">
                           <a:latin typeface="Arial"/>
                           <a:cs typeface="Arial"/>
                         </a:rPr>
                         <a:t> </a:t>
                       </a:r>
                       <a:r>
-                        <a:rPr lang="en-AU" sz="1800" dirty="0" err="1" smtClean="0">
+                        <a:rPr lang="en-AU" sz="1800" dirty="0" err="1">
                           <a:latin typeface="Arial"/>
                           <a:cs typeface="Arial"/>
                         </a:rPr>
                         <a:t>Vagenas</a:t>
                       </a:r>
                       <a:r>
-                        <a:rPr lang="en-AU" sz="1800" dirty="0" smtClean="0">
+                        <a:rPr lang="en-AU" sz="1800" dirty="0">
                           <a:latin typeface="Arial"/>
                           <a:cs typeface="Arial"/>
                         </a:rPr>
@@ -3738,7 +3838,7 @@
                         <a:defRPr/>
                       </a:pPr>
                       <a:r>
-                        <a:rPr lang="en-AU" sz="1800" dirty="0" smtClean="0">
+                        <a:rPr lang="en-AU" sz="1800" dirty="0">
                           <a:solidFill>
                             <a:srgbClr val="FF0000"/>
                           </a:solidFill>
@@ -3788,6 +3888,11 @@
                     </a:lnB>
                   </a:tcPr>
                 </a:tc>
+                <a:extLst>
+                  <a:ext uri="{0D108BD9-81ED-4DB2-BD59-A6C34878D82A}">
+                    <a16:rowId xmlns:a16="http://schemas.microsoft.com/office/drawing/2014/main" val="10002"/>
+                  </a:ext>
+                </a:extLst>
               </a:tr>
               <a:tr h="370840">
                 <a:tc>
@@ -3796,21 +3901,21 @@
                     <a:lstStyle/>
                     <a:p>
                       <a:r>
-                        <a:rPr lang="en-AU" sz="1800" dirty="0" smtClean="0">
+                        <a:rPr lang="en-AU" sz="1800" dirty="0">
                           <a:latin typeface="Arial"/>
                           <a:cs typeface="Arial"/>
                         </a:rPr>
                         <a:t>Laura </a:t>
                       </a:r>
                       <a:r>
-                        <a:rPr lang="en-AU" sz="1800" dirty="0" err="1" smtClean="0">
+                        <a:rPr lang="en-AU" sz="1800" dirty="0" err="1">
                           <a:latin typeface="Arial"/>
                           <a:cs typeface="Arial"/>
                         </a:rPr>
                         <a:t>Ziems</a:t>
                       </a:r>
                       <a:r>
-                        <a:rPr lang="en-AU" sz="1800" dirty="0" smtClean="0">
+                        <a:rPr lang="en-AU" sz="1800" dirty="0">
                           <a:latin typeface="Arial"/>
                           <a:cs typeface="Arial"/>
                         </a:rPr>
@@ -3881,13 +3986,13 @@
                         <a:defRPr/>
                       </a:pPr>
                       <a:r>
-                        <a:rPr lang="en-AU" sz="1800" dirty="0" smtClean="0">
+                        <a:rPr lang="en-AU" sz="1800" dirty="0">
                           <a:latin typeface="Arial"/>
                           <a:cs typeface="Arial"/>
                         </a:rPr>
                         <a:t>Treasurer</a:t>
                       </a:r>
-                      <a:endParaRPr lang="en-AU" sz="1800" dirty="0" smtClean="0">
+                      <a:endParaRPr lang="en-AU" sz="1800" dirty="0">
                         <a:solidFill>
                           <a:srgbClr val="FF0000"/>
                         </a:solidFill>
@@ -3935,6 +4040,11 @@
                     </a:lnB>
                   </a:tcPr>
                 </a:tc>
+                <a:extLst>
+                  <a:ext uri="{0D108BD9-81ED-4DB2-BD59-A6C34878D82A}">
+                    <a16:rowId xmlns:a16="http://schemas.microsoft.com/office/drawing/2014/main" val="10003"/>
+                  </a:ext>
+                </a:extLst>
               </a:tr>
               <a:tr h="370840">
                 <a:tc>
@@ -3943,7 +4053,7 @@
                     <a:lstStyle/>
                     <a:p>
                       <a:r>
-                        <a:rPr lang="en-AU" sz="1800" dirty="0" smtClean="0">
+                        <a:rPr lang="en-AU" sz="1800" dirty="0">
                           <a:latin typeface="Arial"/>
                           <a:cs typeface="Arial"/>
                         </a:rPr>
@@ -4014,7 +4124,7 @@
                         <a:defRPr/>
                       </a:pPr>
                       <a:r>
-                        <a:rPr lang="en-AU" sz="1800" dirty="0" smtClean="0">
+                        <a:rPr lang="en-AU" sz="1800" dirty="0">
                           <a:solidFill>
                             <a:schemeClr val="accent2">
                               <a:lumMod val="75000"/>
@@ -4066,6 +4176,11 @@
                     </a:lnB>
                   </a:tcPr>
                 </a:tc>
+                <a:extLst>
+                  <a:ext uri="{0D108BD9-81ED-4DB2-BD59-A6C34878D82A}">
+                    <a16:rowId xmlns:a16="http://schemas.microsoft.com/office/drawing/2014/main" val="10004"/>
+                  </a:ext>
+                </a:extLst>
               </a:tr>
               <a:tr h="370840">
                 <a:tc>
@@ -4074,14 +4189,14 @@
                     <a:lstStyle/>
                     <a:p>
                       <a:r>
-                        <a:rPr lang="en-AU" sz="1800" dirty="0" err="1" smtClean="0">
+                        <a:rPr lang="en-AU" sz="1800" dirty="0" err="1">
                           <a:latin typeface="Arial"/>
                           <a:cs typeface="Arial"/>
                         </a:rPr>
                         <a:t>Mingzhu</a:t>
                       </a:r>
                       <a:r>
-                        <a:rPr lang="en-AU" sz="1800" dirty="0" smtClean="0">
+                        <a:rPr lang="en-AU" sz="1800" dirty="0">
                           <a:latin typeface="Arial"/>
                           <a:cs typeface="Arial"/>
                         </a:rPr>
@@ -4152,7 +4267,7 @@
                         <a:defRPr/>
                       </a:pPr>
                       <a:r>
-                        <a:rPr lang="en-AU" sz="1800" dirty="0" smtClean="0">
+                        <a:rPr lang="en-AU" sz="1800" dirty="0">
                           <a:solidFill>
                             <a:srgbClr val="00B050"/>
                           </a:solidFill>
@@ -4202,6 +4317,11 @@
                     </a:lnB>
                   </a:tcPr>
                 </a:tc>
+                <a:extLst>
+                  <a:ext uri="{0D108BD9-81ED-4DB2-BD59-A6C34878D82A}">
+                    <a16:rowId xmlns:a16="http://schemas.microsoft.com/office/drawing/2014/main" val="10005"/>
+                  </a:ext>
+                </a:extLst>
               </a:tr>
               <a:tr h="370840">
                 <a:tc>
@@ -4210,7 +4330,7 @@
                     <a:lstStyle/>
                     <a:p>
                       <a:r>
-                        <a:rPr lang="en-AU" sz="1800" dirty="0" smtClean="0">
+                        <a:rPr lang="en-AU" sz="1800" dirty="0">
                           <a:latin typeface="Arial"/>
                           <a:cs typeface="Arial"/>
                         </a:rPr>
@@ -4281,7 +4401,7 @@
                         <a:defRPr/>
                       </a:pPr>
                       <a:r>
-                        <a:rPr lang="en-AU" sz="1800" dirty="0" smtClean="0">
+                        <a:rPr lang="en-AU" sz="1800" dirty="0">
                           <a:solidFill>
                             <a:schemeClr val="accent4">
                               <a:lumMod val="75000"/>
@@ -4333,6 +4453,11 @@
                     </a:lnB>
                   </a:tcPr>
                 </a:tc>
+                <a:extLst>
+                  <a:ext uri="{0D108BD9-81ED-4DB2-BD59-A6C34878D82A}">
+                    <a16:rowId xmlns:a16="http://schemas.microsoft.com/office/drawing/2014/main" val="10006"/>
+                  </a:ext>
+                </a:extLst>
               </a:tr>
               <a:tr h="370840">
                 <a:tc>
@@ -4341,7 +4466,7 @@
                     <a:lstStyle/>
                     <a:p>
                       <a:r>
-                        <a:rPr lang="en-AU" sz="1800" dirty="0" smtClean="0">
+                        <a:rPr lang="en-AU" sz="1800" dirty="0">
                           <a:latin typeface="Arial"/>
                           <a:cs typeface="Arial"/>
                         </a:rPr>
@@ -4412,7 +4537,7 @@
                         <a:defRPr/>
                       </a:pPr>
                       <a:r>
-                        <a:rPr lang="en-AU" sz="1800" dirty="0" smtClean="0">
+                        <a:rPr lang="en-AU" sz="1800" dirty="0">
                           <a:solidFill>
                             <a:srgbClr val="002060"/>
                           </a:solidFill>
@@ -4462,6 +4587,11 @@
                     </a:lnB>
                   </a:tcPr>
                 </a:tc>
+                <a:extLst>
+                  <a:ext uri="{0D108BD9-81ED-4DB2-BD59-A6C34878D82A}">
+                    <a16:rowId xmlns:a16="http://schemas.microsoft.com/office/drawing/2014/main" val="10007"/>
+                  </a:ext>
+                </a:extLst>
               </a:tr>
               <a:tr h="370840">
                 <a:tc>
@@ -4470,21 +4600,21 @@
                     <a:lstStyle/>
                     <a:p>
                       <a:r>
-                        <a:rPr lang="en-AU" sz="1800" dirty="0" err="1" smtClean="0">
+                        <a:rPr lang="en-AU" sz="1800" dirty="0" err="1">
                           <a:latin typeface="Arial"/>
                           <a:cs typeface="Arial"/>
                         </a:rPr>
                         <a:t>Jeeva</a:t>
                       </a:r>
                       <a:r>
-                        <a:rPr lang="en-AU" sz="1800" dirty="0" smtClean="0">
+                        <a:rPr lang="en-AU" sz="1800" dirty="0">
                           <a:latin typeface="Arial"/>
                           <a:cs typeface="Arial"/>
                         </a:rPr>
                         <a:t> </a:t>
                       </a:r>
                       <a:r>
-                        <a:rPr lang="en-AU" sz="1800" dirty="0" err="1" smtClean="0">
+                        <a:rPr lang="en-AU" sz="1800" dirty="0" err="1">
                           <a:latin typeface="Arial"/>
                           <a:cs typeface="Arial"/>
                         </a:rPr>
@@ -4555,7 +4685,7 @@
                         <a:defRPr/>
                       </a:pPr>
                       <a:r>
-                        <a:rPr lang="en-AU" sz="1800" dirty="0" smtClean="0">
+                        <a:rPr lang="en-AU" sz="1800" dirty="0">
                           <a:solidFill>
                             <a:srgbClr val="00B0F0"/>
                           </a:solidFill>
@@ -4605,6 +4735,11 @@
                     </a:lnB>
                   </a:tcPr>
                 </a:tc>
+                <a:extLst>
+                  <a:ext uri="{0D108BD9-81ED-4DB2-BD59-A6C34878D82A}">
+                    <a16:rowId xmlns:a16="http://schemas.microsoft.com/office/drawing/2014/main" val="10008"/>
+                  </a:ext>
+                </a:extLst>
               </a:tr>
               <a:tr h="370840">
                 <a:tc>
@@ -4613,7 +4748,7 @@
                     <a:lstStyle/>
                     <a:p>
                       <a:r>
-                        <a:rPr lang="en-AU" sz="1800" dirty="0" smtClean="0">
+                        <a:rPr lang="en-AU" sz="1800" dirty="0">
                           <a:latin typeface="Arial"/>
                           <a:cs typeface="Arial"/>
                         </a:rPr>
@@ -4684,7 +4819,7 @@
                         <a:defRPr/>
                       </a:pPr>
                       <a:r>
-                        <a:rPr lang="en-AU" sz="1800" dirty="0" smtClean="0">
+                        <a:rPr lang="en-AU" sz="1800" dirty="0">
                           <a:solidFill>
                             <a:srgbClr val="00B050"/>
                           </a:solidFill>
@@ -4693,7 +4828,7 @@
                         </a:rPr>
                         <a:t>Continuing Professional Development</a:t>
                       </a:r>
-                      <a:endParaRPr lang="en-AU" sz="1800" dirty="0" smtClean="0">
+                      <a:endParaRPr lang="en-AU" sz="1800" dirty="0">
                         <a:solidFill>
                           <a:srgbClr val="00B0F0"/>
                         </a:solidFill>
@@ -4741,6 +4876,11 @@
                     </a:lnB>
                   </a:tcPr>
                 </a:tc>
+                <a:extLst>
+                  <a:ext uri="{0D108BD9-81ED-4DB2-BD59-A6C34878D82A}">
+                    <a16:rowId xmlns:a16="http://schemas.microsoft.com/office/drawing/2014/main" val="10009"/>
+                  </a:ext>
+                </a:extLst>
               </a:tr>
             </a:tbl>
           </a:graphicData>
@@ -4781,7 +4921,7 @@
           <p:cNvPr id="2" name="Title 1">
             <a:extLst>
               <a:ext uri="{FF2B5EF4-FFF2-40B4-BE49-F238E27FC236}">
-                <a16:creationId xmlns="" xmlns:a16="http://schemas.microsoft.com/office/drawing/2014/main" id="{B3A399C4-2389-45F8-BDA6-8A0E28E47CB8}"/>
+                <a16:creationId xmlns:a16="http://schemas.microsoft.com/office/drawing/2014/main" id="{B3A399C4-2389-45F8-BDA6-8A0E28E47CB8}"/>
               </a:ext>
             </a:extLst>
           </p:cNvPr>
@@ -4808,25 +4948,11 @@
               <a:rPr lang="en-AU" sz="4400" b="1" dirty="0">
                 <a:latin typeface="+mn-lt"/>
               </a:rPr>
-              <a:t>Menu for </a:t>
-            </a:r>
-            <a:r>
-              <a:rPr lang="en-AU" sz="4400" b="1" dirty="0" smtClean="0">
-                <a:latin typeface="+mn-lt"/>
-              </a:rPr>
-              <a:t>dinner</a:t>
-            </a:r>
-            <a:r>
-              <a:rPr lang="en-AU" sz="4400" dirty="0"/>
-              <a:t/>
+              <a:t>Menu for dinner</a:t>
             </a:r>
             <a:br>
               <a:rPr lang="en-AU" sz="4400" dirty="0"/>
             </a:br>
-            <a:r>
-              <a:rPr lang="en-AU" sz="3600" dirty="0"/>
-              <a:t/>
-            </a:r>
             <a:br>
               <a:rPr lang="en-AU" sz="3600" dirty="0"/>
             </a:br>
@@ -4837,14 +4963,6 @@
                 </a:solidFill>
               </a:rPr>
               <a:t>Burger Urge</a:t>
-            </a:r>
-            <a:r>
-              <a:rPr lang="en-AU" sz="3600" dirty="0">
-                <a:solidFill>
-                  <a:srgbClr val="FF0000"/>
-                </a:solidFill>
-              </a:rPr>
-              <a:t/>
             </a:r>
             <a:br>
               <a:rPr lang="en-AU" sz="3600" dirty="0">
@@ -4853,10 +4971,6 @@
                 </a:solidFill>
               </a:rPr>
             </a:br>
-            <a:r>
-              <a:rPr lang="en-AU" sz="3600" dirty="0"/>
-              <a:t/>
-            </a:r>
             <a:br>
               <a:rPr lang="en-AU" sz="3600" dirty="0"/>
             </a:br>
@@ -4879,7 +4993,7 @@
           <p:cNvPr id="3" name="Text Placeholder 2">
             <a:extLst>
               <a:ext uri="{FF2B5EF4-FFF2-40B4-BE49-F238E27FC236}">
-                <a16:creationId xmlns="" xmlns:a16="http://schemas.microsoft.com/office/drawing/2014/main" id="{C39A4A2F-743D-4047-A84F-5AB566B68600}"/>
+                <a16:creationId xmlns:a16="http://schemas.microsoft.com/office/drawing/2014/main" id="{C39A4A2F-743D-4047-A84F-5AB566B68600}"/>
               </a:ext>
             </a:extLst>
           </p:cNvPr>
@@ -4943,7 +5057,7 @@
           <p:cNvPr id="2" name="Picture 1">
             <a:extLst>
               <a:ext uri="{FF2B5EF4-FFF2-40B4-BE49-F238E27FC236}">
-                <a16:creationId xmlns="" xmlns:a16="http://schemas.microsoft.com/office/drawing/2014/main" id="{FC8A8025-20DB-41B5-A16F-4868ADB36AC1}"/>
+                <a16:creationId xmlns:a16="http://schemas.microsoft.com/office/drawing/2014/main" id="{FC8A8025-20DB-41B5-A16F-4868ADB36AC1}"/>
               </a:ext>
             </a:extLst>
           </p:cNvPr>
@@ -4973,7 +5087,7 @@
           <p:cNvPr id="3" name="Title 2">
             <a:extLst>
               <a:ext uri="{FF2B5EF4-FFF2-40B4-BE49-F238E27FC236}">
-                <a16:creationId xmlns="" xmlns:a16="http://schemas.microsoft.com/office/drawing/2014/main" id="{F6BCE3DA-E3CA-47CE-B819-CF3E0BF01DBB}"/>
+                <a16:creationId xmlns:a16="http://schemas.microsoft.com/office/drawing/2014/main" id="{F6BCE3DA-E3CA-47CE-B819-CF3E0BF01DBB}"/>
               </a:ext>
             </a:extLst>
           </p:cNvPr>
@@ -5028,7 +5142,7 @@
           <p:cNvPr id="6" name="Title 2">
             <a:extLst>
               <a:ext uri="{FF2B5EF4-FFF2-40B4-BE49-F238E27FC236}">
-                <a16:creationId xmlns="" xmlns:a16="http://schemas.microsoft.com/office/drawing/2014/main" id="{F6BCE3DA-E3CA-47CE-B819-CF3E0BF01DBB}"/>
+                <a16:creationId xmlns:a16="http://schemas.microsoft.com/office/drawing/2014/main" id="{F6BCE3DA-E3CA-47CE-B819-CF3E0BF01DBB}"/>
               </a:ext>
             </a:extLst>
           </p:cNvPr>
@@ -5072,14 +5186,11 @@
           <a:p>
             <a:pPr algn="ctr"/>
             <a:r>
-              <a:rPr lang="en-AU" b="1" dirty="0" smtClean="0">
+              <a:rPr lang="en-AU" b="1" dirty="0">
                 <a:latin typeface="+mn-lt"/>
               </a:rPr>
               <a:t>UPCOMING EVENTS 2019</a:t>
             </a:r>
-            <a:endParaRPr lang="en-AU" b="1" dirty="0">
-              <a:latin typeface="+mn-lt"/>
-            </a:endParaRPr>
           </a:p>
         </p:txBody>
       </p:sp>
@@ -5118,7 +5229,7 @@
           <p:cNvPr id="6" name="Title 2">
             <a:extLst>
               <a:ext uri="{FF2B5EF4-FFF2-40B4-BE49-F238E27FC236}">
-                <a16:creationId xmlns="" xmlns:a16="http://schemas.microsoft.com/office/drawing/2014/main" id="{F6BCE3DA-E3CA-47CE-B819-CF3E0BF01DBB}"/>
+                <a16:creationId xmlns:a16="http://schemas.microsoft.com/office/drawing/2014/main" id="{F6BCE3DA-E3CA-47CE-B819-CF3E0BF01DBB}"/>
               </a:ext>
             </a:extLst>
           </p:cNvPr>
@@ -5162,14 +5273,11 @@
           <a:p>
             <a:pPr algn="ctr"/>
             <a:r>
-              <a:rPr lang="en-AU" b="1" dirty="0" smtClean="0">
+              <a:rPr lang="en-AU" b="1" dirty="0">
                 <a:latin typeface="+mn-lt"/>
               </a:rPr>
               <a:t>UPCOMING R Shiny Workshop </a:t>
             </a:r>
-            <a:endParaRPr lang="en-AU" b="1" dirty="0">
-              <a:latin typeface="+mn-lt"/>
-            </a:endParaRPr>
           </a:p>
         </p:txBody>
       </p:sp>
@@ -5465,7 +5573,7 @@
   <a:extraClrSchemeLst/>
   <a:extLst>
     <a:ext uri="{05A4C25C-085E-4340-85A3-A5531E510DB2}">
-      <thm15:themeFamily xmlns="" xmlns:thm15="http://schemas.microsoft.com/office/thememl/2012/main" name="Office Theme" id="{62F939B6-93AF-4DB8-9C6B-D6C7DFDC589F}" vid="{4A3C46E8-61CC-4603-A589-7422A47A8E4A}"/>
+      <thm15:themeFamily xmlns:thm15="http://schemas.microsoft.com/office/thememl/2012/main" name="Office Theme" id="{62F939B6-93AF-4DB8-9C6B-D6C7DFDC589F}" vid="{4A3C46E8-61CC-4603-A589-7422A47A8E4A}"/>
     </a:ext>
   </a:extLst>
 </a:theme>

</xml_diff>